<commit_message>
Working randomization of participants
</commit_message>
<xml_diff>
--- a/Images/Instruction_Screen.pptx
+++ b/Images/Instruction_Screen.pptx
@@ -243,7 +243,7 @@
           <a:p>
             <a:fld id="{195A5C98-B522-41E1-B542-F2D678B8A3D7}" type="datetimeFigureOut">
               <a:rPr lang="en-US" smtClean="0"/>
-              <a:t>2/12/2019</a:t>
+              <a:t>2/13/2019</a:t>
             </a:fld>
             <a:endParaRPr lang="en-US"/>
           </a:p>
@@ -413,7 +413,7 @@
           <a:p>
             <a:fld id="{195A5C98-B522-41E1-B542-F2D678B8A3D7}" type="datetimeFigureOut">
               <a:rPr lang="en-US" smtClean="0"/>
-              <a:t>2/12/2019</a:t>
+              <a:t>2/13/2019</a:t>
             </a:fld>
             <a:endParaRPr lang="en-US"/>
           </a:p>
@@ -593,7 +593,7 @@
           <a:p>
             <a:fld id="{195A5C98-B522-41E1-B542-F2D678B8A3D7}" type="datetimeFigureOut">
               <a:rPr lang="en-US" smtClean="0"/>
-              <a:t>2/12/2019</a:t>
+              <a:t>2/13/2019</a:t>
             </a:fld>
             <a:endParaRPr lang="en-US"/>
           </a:p>
@@ -763,7 +763,7 @@
           <a:p>
             <a:fld id="{195A5C98-B522-41E1-B542-F2D678B8A3D7}" type="datetimeFigureOut">
               <a:rPr lang="en-US" smtClean="0"/>
-              <a:t>2/12/2019</a:t>
+              <a:t>2/13/2019</a:t>
             </a:fld>
             <a:endParaRPr lang="en-US"/>
           </a:p>
@@ -1009,7 +1009,7 @@
           <a:p>
             <a:fld id="{195A5C98-B522-41E1-B542-F2D678B8A3D7}" type="datetimeFigureOut">
               <a:rPr lang="en-US" smtClean="0"/>
-              <a:t>2/12/2019</a:t>
+              <a:t>2/13/2019</a:t>
             </a:fld>
             <a:endParaRPr lang="en-US"/>
           </a:p>
@@ -1241,7 +1241,7 @@
           <a:p>
             <a:fld id="{195A5C98-B522-41E1-B542-F2D678B8A3D7}" type="datetimeFigureOut">
               <a:rPr lang="en-US" smtClean="0"/>
-              <a:t>2/12/2019</a:t>
+              <a:t>2/13/2019</a:t>
             </a:fld>
             <a:endParaRPr lang="en-US"/>
           </a:p>
@@ -1608,7 +1608,7 @@
           <a:p>
             <a:fld id="{195A5C98-B522-41E1-B542-F2D678B8A3D7}" type="datetimeFigureOut">
               <a:rPr lang="en-US" smtClean="0"/>
-              <a:t>2/12/2019</a:t>
+              <a:t>2/13/2019</a:t>
             </a:fld>
             <a:endParaRPr lang="en-US"/>
           </a:p>
@@ -1726,7 +1726,7 @@
           <a:p>
             <a:fld id="{195A5C98-B522-41E1-B542-F2D678B8A3D7}" type="datetimeFigureOut">
               <a:rPr lang="en-US" smtClean="0"/>
-              <a:t>2/12/2019</a:t>
+              <a:t>2/13/2019</a:t>
             </a:fld>
             <a:endParaRPr lang="en-US"/>
           </a:p>
@@ -1821,7 +1821,7 @@
           <a:p>
             <a:fld id="{195A5C98-B522-41E1-B542-F2D678B8A3D7}" type="datetimeFigureOut">
               <a:rPr lang="en-US" smtClean="0"/>
-              <a:t>2/12/2019</a:t>
+              <a:t>2/13/2019</a:t>
             </a:fld>
             <a:endParaRPr lang="en-US"/>
           </a:p>
@@ -2098,7 +2098,7 @@
           <a:p>
             <a:fld id="{195A5C98-B522-41E1-B542-F2D678B8A3D7}" type="datetimeFigureOut">
               <a:rPr lang="en-US" smtClean="0"/>
-              <a:t>2/12/2019</a:t>
+              <a:t>2/13/2019</a:t>
             </a:fld>
             <a:endParaRPr lang="en-US"/>
           </a:p>
@@ -2351,7 +2351,7 @@
           <a:p>
             <a:fld id="{195A5C98-B522-41E1-B542-F2D678B8A3D7}" type="datetimeFigureOut">
               <a:rPr lang="en-US" smtClean="0"/>
-              <a:t>2/12/2019</a:t>
+              <a:t>2/13/2019</a:t>
             </a:fld>
             <a:endParaRPr lang="en-US"/>
           </a:p>
@@ -2564,7 +2564,7 @@
           <a:p>
             <a:fld id="{195A5C98-B522-41E1-B542-F2D678B8A3D7}" type="datetimeFigureOut">
               <a:rPr lang="en-US" smtClean="0"/>
-              <a:t>2/12/2019</a:t>
+              <a:t>2/13/2019</a:t>
             </a:fld>
             <a:endParaRPr lang="en-US"/>
           </a:p>
@@ -3072,18 +3072,11 @@
               <a:t> </a:t>
             </a:r>
             <a:r>
-              <a:rPr lang="nb-NO" sz="2400" dirty="0" err="1" smtClean="0">
-                <a:latin typeface="Arial" panose="020B0604020202020204" pitchFamily="34" charset="0"/>
-                <a:cs typeface="Arial" panose="020B0604020202020204" pitchFamily="34" charset="0"/>
-              </a:rPr>
-              <a:t>Lub</a:t>
-            </a:r>
-            <a:r>
-              <a:rPr lang="nb-NO" sz="2400" dirty="0" smtClean="0">
-                <a:latin typeface="Arial" panose="020B0604020202020204" pitchFamily="34" charset="0"/>
-                <a:cs typeface="Arial" panose="020B0604020202020204" pitchFamily="34" charset="0"/>
-              </a:rPr>
-              <a:t> </a:t>
+              <a:rPr lang="nb-NO" sz="2400" smtClean="0">
+                <a:latin typeface="Arial" panose="020B0604020202020204" pitchFamily="34" charset="0"/>
+                <a:cs typeface="Arial" panose="020B0604020202020204" pitchFamily="34" charset="0"/>
+              </a:rPr>
+              <a:t>Lup </a:t>
             </a:r>
             <a:r>
               <a:rPr lang="nb-NO" sz="2400" dirty="0" err="1" smtClean="0">
@@ -3259,21 +3252,7 @@
                 <a:latin typeface="Arial" panose="020B0604020202020204" pitchFamily="34" charset="0"/>
                 <a:cs typeface="Arial" panose="020B0604020202020204" pitchFamily="34" charset="0"/>
               </a:rPr>
-              <a:t> </a:t>
-            </a:r>
-            <a:r>
-              <a:rPr lang="nb-NO" sz="2400" dirty="0" smtClean="0">
-                <a:latin typeface="Arial" panose="020B0604020202020204" pitchFamily="34" charset="0"/>
-                <a:cs typeface="Arial" panose="020B0604020202020204" pitchFamily="34" charset="0"/>
-              </a:rPr>
-              <a:t>in </a:t>
-            </a:r>
-            <a:r>
-              <a:rPr lang="nb-NO" sz="2400" dirty="0" smtClean="0">
-                <a:latin typeface="Arial" panose="020B0604020202020204" pitchFamily="34" charset="0"/>
-                <a:cs typeface="Arial" panose="020B0604020202020204" pitchFamily="34" charset="0"/>
-              </a:rPr>
-              <a:t>his </a:t>
+              <a:t> in his </a:t>
             </a:r>
             <a:r>
               <a:rPr lang="nb-NO" sz="2400" dirty="0" err="1" smtClean="0">
@@ -3326,7 +3305,7 @@
               <a:t> </a:t>
             </a:r>
             <a:r>
-              <a:rPr lang="nb-NO" sz="2400" smtClean="0">
+              <a:rPr lang="nb-NO" sz="2400" dirty="0" err="1" smtClean="0">
                 <a:latin typeface="Arial" panose="020B0604020202020204" pitchFamily="34" charset="0"/>
                 <a:cs typeface="Arial" panose="020B0604020202020204" pitchFamily="34" charset="0"/>
               </a:rPr>

</xml_diff>